<commit_message>
recover file. Assignment 1
</commit_message>
<xml_diff>
--- a/PROPOSAL 101.pptx
+++ b/PROPOSAL 101.pptx
@@ -6521,7 +6521,7 @@
               <a:t>Torikul</a:t>
             </a:r>
             <a:r>
-              <a:rPr lang="en-US" sz="2800">
+              <a:rPr lang="en-US" sz="2800" dirty="0">
                 <a:solidFill>
                   <a:schemeClr val="bg1"/>
                 </a:solidFill>
@@ -6531,24 +6531,14 @@
               <a:t> </a:t>
             </a:r>
             <a:r>
-              <a:rPr lang="en-US" sz="2800" smtClean="0">
+              <a:rPr lang="en-US" sz="2800" dirty="0" smtClean="0">
                 <a:solidFill>
                   <a:schemeClr val="bg1"/>
                 </a:solidFill>
                 <a:latin typeface="Calibri" panose="020F0502020204030204" pitchFamily="34" charset="0"/>
                 <a:ea typeface="Calibri" panose="020F0502020204030204" pitchFamily="34" charset="0"/>
               </a:rPr>
-              <a:t>Islam</a:t>
-            </a:r>
-            <a:r>
-              <a:rPr lang="en-US" sz="2800" smtClean="0">
-                <a:solidFill>
-                  <a:schemeClr val="bg1"/>
-                </a:solidFill>
-                <a:latin typeface="Calibri" panose="020F0502020204030204" pitchFamily="34" charset="0"/>
-                <a:ea typeface="Calibri" panose="020F0502020204030204" pitchFamily="34" charset="0"/>
-              </a:rPr>
-              <a:t> </a:t>
+              <a:t>Islam </a:t>
             </a:r>
             <a:r>
               <a:rPr lang="en-US" sz="2800" dirty="0">
@@ -6772,7 +6762,27 @@
                 <a:latin typeface="Calibri" panose="020F0502020204030204" pitchFamily="34" charset="0"/>
                 <a:ea typeface="Calibri" panose="020F0502020204030204" pitchFamily="34" charset="0"/>
               </a:rPr>
-              <a:t> Ahmed (F17040117)</a:t>
+              <a:t> Ahmed </a:t>
+            </a:r>
+            <a:r>
+              <a:rPr lang="en-US" sz="2800">
+                <a:solidFill>
+                  <a:schemeClr val="bg1"/>
+                </a:solidFill>
+                <a:latin typeface="Calibri" panose="020F0502020204030204" pitchFamily="34" charset="0"/>
+                <a:ea typeface="Calibri" panose="020F0502020204030204" pitchFamily="34" charset="0"/>
+              </a:rPr>
+              <a:t>(</a:t>
+            </a:r>
+            <a:r>
+              <a:rPr lang="en-US" sz="2800" smtClean="0">
+                <a:solidFill>
+                  <a:schemeClr val="bg1"/>
+                </a:solidFill>
+                <a:latin typeface="Calibri" panose="020F0502020204030204" pitchFamily="34" charset="0"/>
+                <a:ea typeface="Calibri" panose="020F0502020204030204" pitchFamily="34" charset="0"/>
+              </a:rPr>
+              <a:t>F17040116)</a:t>
             </a:r>
             <a:endParaRPr lang="en-US" sz="1600" dirty="0">
               <a:solidFill>

</xml_diff>